<commit_message>
update one presentation slide
</commit_message>
<xml_diff>
--- a/00_metis_milestone_sumbissions/05_project_final_data_engineering_tri_le.pptx
+++ b/00_metis_milestone_sumbissions/05_project_final_data_engineering_tri_le.pptx
@@ -5972,13 +5972,40 @@
           <a:p>
             <a:pPr algn="ctr"/>
             <a:r>
+              <a:rPr lang="en-US" sz="3600">
+                <a:solidFill>
+                  <a:schemeClr val="accent5"/>
+                </a:solidFill>
+                <a:latin typeface="Rockwell" panose="02060603020205020403" pitchFamily="18" charset="77"/>
+              </a:rPr>
+              <a:t>54</a:t>
+            </a:r>
+            <a:r>
               <a:rPr lang="en-US" sz="3600" dirty="0">
                 <a:solidFill>
                   <a:schemeClr val="accent5"/>
                 </a:solidFill>
                 <a:latin typeface="Rockwell" panose="02060603020205020403" pitchFamily="18" charset="77"/>
               </a:rPr>
-              <a:t>? words</a:t>
+              <a:t>3</a:t>
+            </a:r>
+            <a:r>
+              <a:rPr lang="en-US" sz="3600">
+                <a:solidFill>
+                  <a:schemeClr val="accent5"/>
+                </a:solidFill>
+                <a:latin typeface="Rockwell" panose="02060603020205020403" pitchFamily="18" charset="77"/>
+              </a:rPr>
+              <a:t> </a:t>
+            </a:r>
+            <a:r>
+              <a:rPr lang="en-US" sz="3600" dirty="0">
+                <a:solidFill>
+                  <a:schemeClr val="accent5"/>
+                </a:solidFill>
+                <a:latin typeface="Rockwell" panose="02060603020205020403" pitchFamily="18" charset="77"/>
+              </a:rPr>
+              <a:t>words</a:t>
             </a:r>
           </a:p>
         </p:txBody>

</xml_diff>